<commit_message>
Incorporated Casey's comments to platooning paper
</commit_message>
<xml_diff>
--- a/docs/AIAA 2016 highway platooning/fig/modeControllers.pptx
+++ b/docs/AIAA 2016 highway platooning/fig/modeControllers.pptx
@@ -154,7 +154,7 @@
           </a:lstStyle>
           <a:p>
             <a:r>
-              <a:rPr lang="en-US" smtClean="0"/>
+              <a:rPr lang="en-US"/>
               <a:t>Click to edit Master title style</a:t>
             </a:r>
             <a:endParaRPr lang="en-US" dirty="0"/>
@@ -219,7 +219,7 @@
           </a:lstStyle>
           <a:p>
             <a:r>
-              <a:rPr lang="en-US" smtClean="0"/>
+              <a:rPr lang="en-US"/>
               <a:t>Click to edit Master subtitle style</a:t>
             </a:r>
             <a:endParaRPr lang="en-US" dirty="0"/>
@@ -243,7 +243,7 @@
           <a:p>
             <a:fld id="{672AD7E1-AA2C-46F3-A94C-00AB04138B09}" type="datetimeFigureOut">
               <a:rPr lang="en-US" smtClean="0"/>
-              <a:t>2/12/2016</a:t>
+              <a:t>4/12/2016</a:t>
             </a:fld>
             <a:endParaRPr lang="en-US"/>
           </a:p>
@@ -337,7 +337,7 @@
           <a:lstStyle/>
           <a:p>
             <a:r>
-              <a:rPr lang="en-US" smtClean="0"/>
+              <a:rPr lang="en-US"/>
               <a:t>Click to edit Master title style</a:t>
             </a:r>
             <a:endParaRPr lang="en-US" dirty="0"/>
@@ -361,35 +361,35 @@
           <a:p>
             <a:pPr lvl="0"/>
             <a:r>
-              <a:rPr lang="en-US" smtClean="0"/>
+              <a:rPr lang="en-US"/>
               <a:t>Click to edit Master text styles</a:t>
             </a:r>
           </a:p>
           <a:p>
             <a:pPr lvl="1"/>
             <a:r>
-              <a:rPr lang="en-US" smtClean="0"/>
+              <a:rPr lang="en-US"/>
               <a:t>Second level</a:t>
             </a:r>
           </a:p>
           <a:p>
             <a:pPr lvl="2"/>
             <a:r>
-              <a:rPr lang="en-US" smtClean="0"/>
+              <a:rPr lang="en-US"/>
               <a:t>Third level</a:t>
             </a:r>
           </a:p>
           <a:p>
             <a:pPr lvl="3"/>
             <a:r>
-              <a:rPr lang="en-US" smtClean="0"/>
+              <a:rPr lang="en-US"/>
               <a:t>Fourth level</a:t>
             </a:r>
           </a:p>
           <a:p>
             <a:pPr lvl="4"/>
             <a:r>
-              <a:rPr lang="en-US" smtClean="0"/>
+              <a:rPr lang="en-US"/>
               <a:t>Fifth level</a:t>
             </a:r>
             <a:endParaRPr lang="en-US" dirty="0"/>
@@ -413,7 +413,7 @@
           <a:p>
             <a:fld id="{672AD7E1-AA2C-46F3-A94C-00AB04138B09}" type="datetimeFigureOut">
               <a:rPr lang="en-US" smtClean="0"/>
-              <a:t>2/12/2016</a:t>
+              <a:t>4/12/2016</a:t>
             </a:fld>
             <a:endParaRPr lang="en-US"/>
           </a:p>
@@ -512,7 +512,7 @@
           <a:lstStyle/>
           <a:p>
             <a:r>
-              <a:rPr lang="en-US" smtClean="0"/>
+              <a:rPr lang="en-US"/>
               <a:t>Click to edit Master title style</a:t>
             </a:r>
             <a:endParaRPr lang="en-US" dirty="0"/>
@@ -541,35 +541,35 @@
           <a:p>
             <a:pPr lvl="0"/>
             <a:r>
-              <a:rPr lang="en-US" smtClean="0"/>
+              <a:rPr lang="en-US"/>
               <a:t>Click to edit Master text styles</a:t>
             </a:r>
           </a:p>
           <a:p>
             <a:pPr lvl="1"/>
             <a:r>
-              <a:rPr lang="en-US" smtClean="0"/>
+              <a:rPr lang="en-US"/>
               <a:t>Second level</a:t>
             </a:r>
           </a:p>
           <a:p>
             <a:pPr lvl="2"/>
             <a:r>
-              <a:rPr lang="en-US" smtClean="0"/>
+              <a:rPr lang="en-US"/>
               <a:t>Third level</a:t>
             </a:r>
           </a:p>
           <a:p>
             <a:pPr lvl="3"/>
             <a:r>
-              <a:rPr lang="en-US" smtClean="0"/>
+              <a:rPr lang="en-US"/>
               <a:t>Fourth level</a:t>
             </a:r>
           </a:p>
           <a:p>
             <a:pPr lvl="4"/>
             <a:r>
-              <a:rPr lang="en-US" smtClean="0"/>
+              <a:rPr lang="en-US"/>
               <a:t>Fifth level</a:t>
             </a:r>
             <a:endParaRPr lang="en-US" dirty="0"/>
@@ -593,7 +593,7 @@
           <a:p>
             <a:fld id="{672AD7E1-AA2C-46F3-A94C-00AB04138B09}" type="datetimeFigureOut">
               <a:rPr lang="en-US" smtClean="0"/>
-              <a:t>2/12/2016</a:t>
+              <a:t>4/12/2016</a:t>
             </a:fld>
             <a:endParaRPr lang="en-US"/>
           </a:p>
@@ -687,7 +687,7 @@
           <a:lstStyle/>
           <a:p>
             <a:r>
-              <a:rPr lang="en-US" smtClean="0"/>
+              <a:rPr lang="en-US"/>
               <a:t>Click to edit Master title style</a:t>
             </a:r>
             <a:endParaRPr lang="en-US" dirty="0"/>
@@ -711,35 +711,35 @@
           <a:p>
             <a:pPr lvl="0"/>
             <a:r>
-              <a:rPr lang="en-US" smtClean="0"/>
+              <a:rPr lang="en-US"/>
               <a:t>Click to edit Master text styles</a:t>
             </a:r>
           </a:p>
           <a:p>
             <a:pPr lvl="1"/>
             <a:r>
-              <a:rPr lang="en-US" smtClean="0"/>
+              <a:rPr lang="en-US"/>
               <a:t>Second level</a:t>
             </a:r>
           </a:p>
           <a:p>
             <a:pPr lvl="2"/>
             <a:r>
-              <a:rPr lang="en-US" smtClean="0"/>
+              <a:rPr lang="en-US"/>
               <a:t>Third level</a:t>
             </a:r>
           </a:p>
           <a:p>
             <a:pPr lvl="3"/>
             <a:r>
-              <a:rPr lang="en-US" smtClean="0"/>
+              <a:rPr lang="en-US"/>
               <a:t>Fourth level</a:t>
             </a:r>
           </a:p>
           <a:p>
             <a:pPr lvl="4"/>
             <a:r>
-              <a:rPr lang="en-US" smtClean="0"/>
+              <a:rPr lang="en-US"/>
               <a:t>Fifth level</a:t>
             </a:r>
             <a:endParaRPr lang="en-US" dirty="0"/>
@@ -763,7 +763,7 @@
           <a:p>
             <a:fld id="{672AD7E1-AA2C-46F3-A94C-00AB04138B09}" type="datetimeFigureOut">
               <a:rPr lang="en-US" smtClean="0"/>
-              <a:t>2/12/2016</a:t>
+              <a:t>4/12/2016</a:t>
             </a:fld>
             <a:endParaRPr lang="en-US"/>
           </a:p>
@@ -866,7 +866,7 @@
           </a:lstStyle>
           <a:p>
             <a:r>
-              <a:rPr lang="en-US" smtClean="0"/>
+              <a:rPr lang="en-US"/>
               <a:t>Click to edit Master title style</a:t>
             </a:r>
             <a:endParaRPr lang="en-US" dirty="0"/>
@@ -986,7 +986,7 @@
           <a:p>
             <a:pPr lvl="0"/>
             <a:r>
-              <a:rPr lang="en-US" smtClean="0"/>
+              <a:rPr lang="en-US"/>
               <a:t>Click to edit Master text styles</a:t>
             </a:r>
           </a:p>
@@ -1009,7 +1009,7 @@
           <a:p>
             <a:fld id="{672AD7E1-AA2C-46F3-A94C-00AB04138B09}" type="datetimeFigureOut">
               <a:rPr lang="en-US" smtClean="0"/>
-              <a:t>2/12/2016</a:t>
+              <a:t>4/12/2016</a:t>
             </a:fld>
             <a:endParaRPr lang="en-US"/>
           </a:p>
@@ -1103,7 +1103,7 @@
           <a:lstStyle/>
           <a:p>
             <a:r>
-              <a:rPr lang="en-US" smtClean="0"/>
+              <a:rPr lang="en-US"/>
               <a:t>Click to edit Master title style</a:t>
             </a:r>
             <a:endParaRPr lang="en-US" dirty="0"/>
@@ -1132,35 +1132,35 @@
           <a:p>
             <a:pPr lvl="0"/>
             <a:r>
-              <a:rPr lang="en-US" smtClean="0"/>
+              <a:rPr lang="en-US"/>
               <a:t>Click to edit Master text styles</a:t>
             </a:r>
           </a:p>
           <a:p>
             <a:pPr lvl="1"/>
             <a:r>
-              <a:rPr lang="en-US" smtClean="0"/>
+              <a:rPr lang="en-US"/>
               <a:t>Second level</a:t>
             </a:r>
           </a:p>
           <a:p>
             <a:pPr lvl="2"/>
             <a:r>
-              <a:rPr lang="en-US" smtClean="0"/>
+              <a:rPr lang="en-US"/>
               <a:t>Third level</a:t>
             </a:r>
           </a:p>
           <a:p>
             <a:pPr lvl="3"/>
             <a:r>
-              <a:rPr lang="en-US" smtClean="0"/>
+              <a:rPr lang="en-US"/>
               <a:t>Fourth level</a:t>
             </a:r>
           </a:p>
           <a:p>
             <a:pPr lvl="4"/>
             <a:r>
-              <a:rPr lang="en-US" smtClean="0"/>
+              <a:rPr lang="en-US"/>
               <a:t>Fifth level</a:t>
             </a:r>
             <a:endParaRPr lang="en-US" dirty="0"/>
@@ -1189,35 +1189,35 @@
           <a:p>
             <a:pPr lvl="0"/>
             <a:r>
-              <a:rPr lang="en-US" smtClean="0"/>
+              <a:rPr lang="en-US"/>
               <a:t>Click to edit Master text styles</a:t>
             </a:r>
           </a:p>
           <a:p>
             <a:pPr lvl="1"/>
             <a:r>
-              <a:rPr lang="en-US" smtClean="0"/>
+              <a:rPr lang="en-US"/>
               <a:t>Second level</a:t>
             </a:r>
           </a:p>
           <a:p>
             <a:pPr lvl="2"/>
             <a:r>
-              <a:rPr lang="en-US" smtClean="0"/>
+              <a:rPr lang="en-US"/>
               <a:t>Third level</a:t>
             </a:r>
           </a:p>
           <a:p>
             <a:pPr lvl="3"/>
             <a:r>
-              <a:rPr lang="en-US" smtClean="0"/>
+              <a:rPr lang="en-US"/>
               <a:t>Fourth level</a:t>
             </a:r>
           </a:p>
           <a:p>
             <a:pPr lvl="4"/>
             <a:r>
-              <a:rPr lang="en-US" smtClean="0"/>
+              <a:rPr lang="en-US"/>
               <a:t>Fifth level</a:t>
             </a:r>
             <a:endParaRPr lang="en-US" dirty="0"/>
@@ -1241,7 +1241,7 @@
           <a:p>
             <a:fld id="{672AD7E1-AA2C-46F3-A94C-00AB04138B09}" type="datetimeFigureOut">
               <a:rPr lang="en-US" smtClean="0"/>
-              <a:t>2/12/2016</a:t>
+              <a:t>4/12/2016</a:t>
             </a:fld>
             <a:endParaRPr lang="en-US"/>
           </a:p>
@@ -1340,7 +1340,7 @@
           <a:lstStyle/>
           <a:p>
             <a:r>
-              <a:rPr lang="en-US" smtClean="0"/>
+              <a:rPr lang="en-US"/>
               <a:t>Click to edit Master title style</a:t>
             </a:r>
             <a:endParaRPr lang="en-US" dirty="0"/>
@@ -1406,7 +1406,7 @@
           <a:p>
             <a:pPr lvl="0"/>
             <a:r>
-              <a:rPr lang="en-US" smtClean="0"/>
+              <a:rPr lang="en-US"/>
               <a:t>Click to edit Master text styles</a:t>
             </a:r>
           </a:p>
@@ -1434,35 +1434,35 @@
           <a:p>
             <a:pPr lvl="0"/>
             <a:r>
-              <a:rPr lang="en-US" smtClean="0"/>
+              <a:rPr lang="en-US"/>
               <a:t>Click to edit Master text styles</a:t>
             </a:r>
           </a:p>
           <a:p>
             <a:pPr lvl="1"/>
             <a:r>
-              <a:rPr lang="en-US" smtClean="0"/>
+              <a:rPr lang="en-US"/>
               <a:t>Second level</a:t>
             </a:r>
           </a:p>
           <a:p>
             <a:pPr lvl="2"/>
             <a:r>
-              <a:rPr lang="en-US" smtClean="0"/>
+              <a:rPr lang="en-US"/>
               <a:t>Third level</a:t>
             </a:r>
           </a:p>
           <a:p>
             <a:pPr lvl="3"/>
             <a:r>
-              <a:rPr lang="en-US" smtClean="0"/>
+              <a:rPr lang="en-US"/>
               <a:t>Fourth level</a:t>
             </a:r>
           </a:p>
           <a:p>
             <a:pPr lvl="4"/>
             <a:r>
-              <a:rPr lang="en-US" smtClean="0"/>
+              <a:rPr lang="en-US"/>
               <a:t>Fifth level</a:t>
             </a:r>
             <a:endParaRPr lang="en-US" dirty="0"/>
@@ -1528,7 +1528,7 @@
           <a:p>
             <a:pPr lvl="0"/>
             <a:r>
-              <a:rPr lang="en-US" smtClean="0"/>
+              <a:rPr lang="en-US"/>
               <a:t>Click to edit Master text styles</a:t>
             </a:r>
           </a:p>
@@ -1556,35 +1556,35 @@
           <a:p>
             <a:pPr lvl="0"/>
             <a:r>
-              <a:rPr lang="en-US" smtClean="0"/>
+              <a:rPr lang="en-US"/>
               <a:t>Click to edit Master text styles</a:t>
             </a:r>
           </a:p>
           <a:p>
             <a:pPr lvl="1"/>
             <a:r>
-              <a:rPr lang="en-US" smtClean="0"/>
+              <a:rPr lang="en-US"/>
               <a:t>Second level</a:t>
             </a:r>
           </a:p>
           <a:p>
             <a:pPr lvl="2"/>
             <a:r>
-              <a:rPr lang="en-US" smtClean="0"/>
+              <a:rPr lang="en-US"/>
               <a:t>Third level</a:t>
             </a:r>
           </a:p>
           <a:p>
             <a:pPr lvl="3"/>
             <a:r>
-              <a:rPr lang="en-US" smtClean="0"/>
+              <a:rPr lang="en-US"/>
               <a:t>Fourth level</a:t>
             </a:r>
           </a:p>
           <a:p>
             <a:pPr lvl="4"/>
             <a:r>
-              <a:rPr lang="en-US" smtClean="0"/>
+              <a:rPr lang="en-US"/>
               <a:t>Fifth level</a:t>
             </a:r>
             <a:endParaRPr lang="en-US" dirty="0"/>
@@ -1608,7 +1608,7 @@
           <a:p>
             <a:fld id="{672AD7E1-AA2C-46F3-A94C-00AB04138B09}" type="datetimeFigureOut">
               <a:rPr lang="en-US" smtClean="0"/>
-              <a:t>2/12/2016</a:t>
+              <a:t>4/12/2016</a:t>
             </a:fld>
             <a:endParaRPr lang="en-US"/>
           </a:p>
@@ -1702,7 +1702,7 @@
           <a:lstStyle/>
           <a:p>
             <a:r>
-              <a:rPr lang="en-US" smtClean="0"/>
+              <a:rPr lang="en-US"/>
               <a:t>Click to edit Master title style</a:t>
             </a:r>
             <a:endParaRPr lang="en-US" dirty="0"/>
@@ -1726,7 +1726,7 @@
           <a:p>
             <a:fld id="{672AD7E1-AA2C-46F3-A94C-00AB04138B09}" type="datetimeFigureOut">
               <a:rPr lang="en-US" smtClean="0"/>
-              <a:t>2/12/2016</a:t>
+              <a:t>4/12/2016</a:t>
             </a:fld>
             <a:endParaRPr lang="en-US"/>
           </a:p>
@@ -1821,7 +1821,7 @@
           <a:p>
             <a:fld id="{672AD7E1-AA2C-46F3-A94C-00AB04138B09}" type="datetimeFigureOut">
               <a:rPr lang="en-US" smtClean="0"/>
-              <a:t>2/12/2016</a:t>
+              <a:t>4/12/2016</a:t>
             </a:fld>
             <a:endParaRPr lang="en-US"/>
           </a:p>
@@ -1924,7 +1924,7 @@
           </a:lstStyle>
           <a:p>
             <a:r>
-              <a:rPr lang="en-US" smtClean="0"/>
+              <a:rPr lang="en-US"/>
               <a:t>Click to edit Master title style</a:t>
             </a:r>
             <a:endParaRPr lang="en-US" dirty="0"/>
@@ -1981,35 +1981,35 @@
           <a:p>
             <a:pPr lvl="0"/>
             <a:r>
-              <a:rPr lang="en-US" smtClean="0"/>
+              <a:rPr lang="en-US"/>
               <a:t>Click to edit Master text styles</a:t>
             </a:r>
           </a:p>
           <a:p>
             <a:pPr lvl="1"/>
             <a:r>
-              <a:rPr lang="en-US" smtClean="0"/>
+              <a:rPr lang="en-US"/>
               <a:t>Second level</a:t>
             </a:r>
           </a:p>
           <a:p>
             <a:pPr lvl="2"/>
             <a:r>
-              <a:rPr lang="en-US" smtClean="0"/>
+              <a:rPr lang="en-US"/>
               <a:t>Third level</a:t>
             </a:r>
           </a:p>
           <a:p>
             <a:pPr lvl="3"/>
             <a:r>
-              <a:rPr lang="en-US" smtClean="0"/>
+              <a:rPr lang="en-US"/>
               <a:t>Fourth level</a:t>
             </a:r>
           </a:p>
           <a:p>
             <a:pPr lvl="4"/>
             <a:r>
-              <a:rPr lang="en-US" smtClean="0"/>
+              <a:rPr lang="en-US"/>
               <a:t>Fifth level</a:t>
             </a:r>
             <a:endParaRPr lang="en-US" dirty="0"/>
@@ -2075,7 +2075,7 @@
           <a:p>
             <a:pPr lvl="0"/>
             <a:r>
-              <a:rPr lang="en-US" smtClean="0"/>
+              <a:rPr lang="en-US"/>
               <a:t>Click to edit Master text styles</a:t>
             </a:r>
           </a:p>
@@ -2098,7 +2098,7 @@
           <a:p>
             <a:fld id="{672AD7E1-AA2C-46F3-A94C-00AB04138B09}" type="datetimeFigureOut">
               <a:rPr lang="en-US" smtClean="0"/>
-              <a:t>2/12/2016</a:t>
+              <a:t>4/12/2016</a:t>
             </a:fld>
             <a:endParaRPr lang="en-US"/>
           </a:p>
@@ -2201,7 +2201,7 @@
           </a:lstStyle>
           <a:p>
             <a:r>
-              <a:rPr lang="en-US" smtClean="0"/>
+              <a:rPr lang="en-US"/>
               <a:t>Click to edit Master title style</a:t>
             </a:r>
             <a:endParaRPr lang="en-US" dirty="0"/>
@@ -2266,7 +2266,7 @@
           </a:lstStyle>
           <a:p>
             <a:r>
-              <a:rPr lang="en-US" smtClean="0"/>
+              <a:rPr lang="en-US"/>
               <a:t>Click icon to add picture</a:t>
             </a:r>
             <a:endParaRPr lang="en-US" dirty="0"/>
@@ -2332,7 +2332,7 @@
           <a:p>
             <a:pPr lvl="0"/>
             <a:r>
-              <a:rPr lang="en-US" smtClean="0"/>
+              <a:rPr lang="en-US"/>
               <a:t>Click to edit Master text styles</a:t>
             </a:r>
           </a:p>
@@ -2355,7 +2355,7 @@
           <a:p>
             <a:fld id="{672AD7E1-AA2C-46F3-A94C-00AB04138B09}" type="datetimeFigureOut">
               <a:rPr lang="en-US" smtClean="0"/>
-              <a:t>2/12/2016</a:t>
+              <a:t>4/12/2016</a:t>
             </a:fld>
             <a:endParaRPr lang="en-US"/>
           </a:p>
@@ -2464,7 +2464,7 @@
           <a:lstStyle/>
           <a:p>
             <a:r>
-              <a:rPr lang="en-US" smtClean="0"/>
+              <a:rPr lang="en-US"/>
               <a:t>Click to edit Master title style</a:t>
             </a:r>
             <a:endParaRPr lang="en-US" dirty="0"/>
@@ -2498,35 +2498,35 @@
           <a:p>
             <a:pPr lvl="0"/>
             <a:r>
-              <a:rPr lang="en-US" smtClean="0"/>
+              <a:rPr lang="en-US"/>
               <a:t>Click to edit Master text styles</a:t>
             </a:r>
           </a:p>
           <a:p>
             <a:pPr lvl="1"/>
             <a:r>
-              <a:rPr lang="en-US" smtClean="0"/>
+              <a:rPr lang="en-US"/>
               <a:t>Second level</a:t>
             </a:r>
           </a:p>
           <a:p>
             <a:pPr lvl="2"/>
             <a:r>
-              <a:rPr lang="en-US" smtClean="0"/>
+              <a:rPr lang="en-US"/>
               <a:t>Third level</a:t>
             </a:r>
           </a:p>
           <a:p>
             <a:pPr lvl="3"/>
             <a:r>
-              <a:rPr lang="en-US" smtClean="0"/>
+              <a:rPr lang="en-US"/>
               <a:t>Fourth level</a:t>
             </a:r>
           </a:p>
           <a:p>
             <a:pPr lvl="4"/>
             <a:r>
-              <a:rPr lang="en-US" smtClean="0"/>
+              <a:rPr lang="en-US"/>
               <a:t>Fifth level</a:t>
             </a:r>
             <a:endParaRPr lang="en-US" dirty="0"/>
@@ -2568,7 +2568,7 @@
           <a:p>
             <a:fld id="{672AD7E1-AA2C-46F3-A94C-00AB04138B09}" type="datetimeFigureOut">
               <a:rPr lang="en-US" smtClean="0"/>
-              <a:t>2/12/2016</a:t>
+              <a:t>4/12/2016</a:t>
             </a:fld>
             <a:endParaRPr lang="en-US"/>
           </a:p>
@@ -2981,8 +2981,8 @@
         </p:nvSpPr>
         <p:spPr>
           <a:xfrm>
-            <a:off x="0" y="2290867"/>
-            <a:ext cx="2286000" cy="1482313"/>
+            <a:off x="-1" y="2290867"/>
+            <a:ext cx="2462651" cy="1731169"/>
           </a:xfrm>
           <a:prstGeom prst="ellipse">
             <a:avLst/>
@@ -3010,7 +3010,7 @@
           <a:lstStyle/>
           <a:p>
             <a:r>
-              <a:rPr lang="en-US" sz="1750" dirty="0">
+              <a:rPr lang="en-US" sz="2000" dirty="0">
                 <a:solidFill>
                   <a:schemeClr val="tx1">
                     <a:lumMod val="50000"/>
@@ -3018,10 +3018,16 @@
                   </a:schemeClr>
                 </a:solidFill>
               </a:rPr>
-              <a:t>Free</a:t>
-            </a:r>
-            <a:r>
-              <a:rPr lang="en-US" sz="1750" dirty="0" smtClean="0">
+              <a:t>Free:</a:t>
+            </a:r>
+          </a:p>
+          <a:p>
+            <a:pPr marL="178594" indent="-178594">
+              <a:buFont typeface="Arial" panose="020B0604020202020204" pitchFamily="34" charset="0"/>
+              <a:buChar char="•"/>
+            </a:pPr>
+            <a:r>
+              <a:rPr lang="en-US" sz="1800" dirty="0">
                 <a:solidFill>
                   <a:schemeClr val="tx1">
                     <a:lumMod val="50000"/>
@@ -3029,33 +3035,8 @@
                   </a:schemeClr>
                 </a:solidFill>
               </a:rPr>
-              <a:t>:</a:t>
-            </a:r>
-          </a:p>
-          <a:p>
-            <a:pPr marL="178594" indent="-178594">
-              <a:buFont typeface="Arial" panose="020B0604020202020204" pitchFamily="34" charset="0"/>
-              <a:buChar char="•"/>
-            </a:pPr>
-            <a:r>
-              <a:rPr lang="en-US" sz="1500" dirty="0" smtClean="0">
-                <a:solidFill>
-                  <a:schemeClr val="tx1">
-                    <a:lumMod val="50000"/>
-                    <a:lumOff val="50000"/>
-                  </a:schemeClr>
-                </a:solidFill>
-              </a:rPr>
-              <a:t>Vehicle not in a platoon or on a highway</a:t>
-            </a:r>
-            <a:endParaRPr lang="en-US" sz="1500" dirty="0">
-              <a:solidFill>
-                <a:schemeClr val="tx1">
-                  <a:lumMod val="50000"/>
-                  <a:lumOff val="50000"/>
-                </a:schemeClr>
-              </a:solidFill>
-            </a:endParaRPr>
+              <a:t>Vehicle not in platoon or on highway</a:t>
+            </a:r>
           </a:p>
         </p:txBody>
       </p:sp>
@@ -3068,7 +3049,7 @@
         <p:spPr>
           <a:xfrm>
             <a:off x="3150948" y="563809"/>
-            <a:ext cx="2286000" cy="1157719"/>
+            <a:ext cx="2286000" cy="1341656"/>
           </a:xfrm>
           <a:prstGeom prst="ellipse">
             <a:avLst/>
@@ -3096,14 +3077,14 @@
           <a:lstStyle/>
           <a:p>
             <a:r>
-              <a:rPr lang="en-US" sz="1750" dirty="0">
+              <a:rPr lang="en-US" sz="2000" dirty="0">
                 <a:solidFill>
                   <a:srgbClr val="0070C0"/>
                 </a:solidFill>
               </a:rPr>
               <a:t>Leader</a:t>
             </a:r>
-            <a:endParaRPr lang="en-US" sz="750" dirty="0">
+            <a:endParaRPr lang="en-US" sz="900" dirty="0">
               <a:solidFill>
                 <a:srgbClr val="0070C0"/>
               </a:solidFill>
@@ -3115,7 +3096,7 @@
               <a:buChar char="•"/>
             </a:pPr>
             <a:r>
-              <a:rPr lang="en-US" sz="1500" dirty="0">
+              <a:rPr lang="en-US" sz="1800" dirty="0">
                 <a:solidFill>
                   <a:srgbClr val="0070C0"/>
                 </a:solidFill>
@@ -3134,7 +3115,7 @@
         <p:spPr>
           <a:xfrm>
             <a:off x="5661224" y="3505548"/>
-            <a:ext cx="2286000" cy="1157719"/>
+            <a:ext cx="2286000" cy="1341656"/>
           </a:xfrm>
           <a:prstGeom prst="ellipse">
             <a:avLst/>
@@ -3162,7 +3143,7 @@
           <a:lstStyle/>
           <a:p>
             <a:r>
-              <a:rPr lang="en-US" sz="1750" dirty="0">
+              <a:rPr lang="en-US" sz="2000" dirty="0">
                 <a:solidFill>
                   <a:schemeClr val="accent6"/>
                 </a:solidFill>
@@ -3176,7 +3157,7 @@
               <a:buChar char="•"/>
             </a:pPr>
             <a:r>
-              <a:rPr lang="en-US" sz="1500" dirty="0">
+              <a:rPr lang="en-US" sz="1800" dirty="0">
                 <a:solidFill>
                   <a:schemeClr val="accent6"/>
                 </a:solidFill>
@@ -3197,8 +3178,8 @@
         </p:nvCxnSpPr>
         <p:spPr>
           <a:xfrm rot="5400000" flipH="1" flipV="1">
-            <a:off x="1868446" y="1225446"/>
-            <a:ext cx="1365278" cy="1199725"/>
+            <a:off x="1971598" y="1365042"/>
+            <a:ext cx="1309754" cy="1048945"/>
           </a:xfrm>
           <a:prstGeom prst="curvedConnector2">
             <a:avLst/>
@@ -3230,8 +3211,8 @@
         </p:nvSpPr>
         <p:spPr>
           <a:xfrm>
-            <a:off x="314359" y="306180"/>
-            <a:ext cx="1415516" cy="342401"/>
+            <a:off x="320347" y="329840"/>
+            <a:ext cx="1359158" cy="707886"/>
           </a:xfrm>
           <a:prstGeom prst="rect">
             <a:avLst/>
@@ -3239,13 +3220,13 @@
           <a:noFill/>
         </p:spPr>
         <p:txBody>
-          <a:bodyPr wrap="none" rtlCol="0">
+          <a:bodyPr wrap="square" rtlCol="0">
             <a:spAutoFit/>
           </a:bodyPr>
           <a:lstStyle/>
           <a:p>
             <a:r>
-              <a:rPr lang="en-US" sz="1625" dirty="0">
+              <a:rPr lang="en-US" sz="2000" dirty="0">
                 <a:solidFill>
                   <a:schemeClr val="tx1">
                     <a:lumMod val="50000"/>
@@ -3266,8 +3247,8 @@
         </p:nvSpPr>
         <p:spPr>
           <a:xfrm>
-            <a:off x="2066236" y="1669794"/>
-            <a:ext cx="2169424" cy="592470"/>
+            <a:off x="2096268" y="1936152"/>
+            <a:ext cx="2532457" cy="707886"/>
           </a:xfrm>
           <a:prstGeom prst="rect">
             <a:avLst/>
@@ -3281,36 +3262,23 @@
           <a:lstStyle/>
           <a:p>
             <a:r>
-              <a:rPr lang="en-US" sz="1625" dirty="0">
+              <a:rPr lang="en-US" sz="2000" dirty="0">
                 <a:solidFill>
                   <a:srgbClr val="0070C0"/>
                 </a:solidFill>
               </a:rPr>
-              <a:t>Merge onto </a:t>
-            </a:r>
-            <a:r>
-              <a:rPr lang="en-US" sz="1625" dirty="0" smtClean="0">
-                <a:solidFill>
-                  <a:srgbClr val="0070C0"/>
-                </a:solidFill>
-              </a:rPr>
-              <a:t>highway</a:t>
-            </a:r>
-          </a:p>
-          <a:p>
-            <a:r>
-              <a:rPr lang="en-US" sz="1625" dirty="0" smtClean="0">
+              <a:t>Merge onto highway</a:t>
+            </a:r>
+          </a:p>
+          <a:p>
+            <a:r>
+              <a:rPr lang="en-US" sz="2000" dirty="0">
                 <a:solidFill>
                   <a:srgbClr val="0070C0"/>
                 </a:solidFill>
               </a:rPr>
               <a:t>(get to absolute state)</a:t>
             </a:r>
-            <a:endParaRPr lang="en-US" sz="1625" dirty="0">
-              <a:solidFill>
-                <a:srgbClr val="0070C0"/>
-              </a:solidFill>
-            </a:endParaRPr>
           </a:p>
         </p:txBody>
       </p:sp>
@@ -3323,7 +3291,7 @@
         <p:spPr>
           <a:xfrm>
             <a:off x="6171399" y="1160837"/>
-            <a:ext cx="2158318" cy="592470"/>
+            <a:ext cx="2464124" cy="707886"/>
           </a:xfrm>
           <a:prstGeom prst="rect">
             <a:avLst/>
@@ -3337,36 +3305,23 @@
           <a:lstStyle/>
           <a:p>
             <a:r>
-              <a:rPr lang="en-US" sz="1625" dirty="0">
+              <a:rPr lang="en-US" sz="2000" dirty="0">
                 <a:solidFill>
                   <a:srgbClr val="0070C0"/>
                 </a:solidFill>
               </a:rPr>
-              <a:t>Create new </a:t>
-            </a:r>
-            <a:r>
-              <a:rPr lang="en-US" sz="1625" dirty="0" smtClean="0">
-                <a:solidFill>
-                  <a:srgbClr val="0070C0"/>
-                </a:solidFill>
-              </a:rPr>
-              <a:t>platoon</a:t>
-            </a:r>
-          </a:p>
-          <a:p>
-            <a:r>
-              <a:rPr lang="en-US" sz="1625" dirty="0" smtClean="0">
+              <a:t>Create new platoon</a:t>
+            </a:r>
+          </a:p>
+          <a:p>
+            <a:r>
+              <a:rPr lang="en-US" sz="2000" dirty="0">
                 <a:solidFill>
                   <a:srgbClr val="0070C0"/>
                 </a:solidFill>
               </a:rPr>
               <a:t>(get to absolute state)</a:t>
             </a:r>
-            <a:endParaRPr lang="en-US" sz="1625" dirty="0">
-              <a:solidFill>
-                <a:srgbClr val="0070C0"/>
-              </a:solidFill>
-            </a:endParaRPr>
           </a:p>
         </p:txBody>
       </p:sp>
@@ -3381,12 +3336,12 @@
         </p:nvCxnSpPr>
         <p:spPr>
           <a:xfrm rot="16200000" flipH="1" flipV="1">
-            <a:off x="1535606" y="340747"/>
-            <a:ext cx="1557514" cy="2342725"/>
+            <a:off x="1593236" y="398378"/>
+            <a:ext cx="1530577" cy="2254400"/>
           </a:xfrm>
           <a:prstGeom prst="curvedConnector3">
             <a:avLst>
-              <a:gd name="adj1" fmla="val -25563"/>
+              <a:gd name="adj1" fmla="val -27773"/>
             </a:avLst>
           </a:prstGeom>
           <a:ln w="38100">
@@ -3419,8 +3374,8 @@
         </p:nvCxnSpPr>
         <p:spPr>
           <a:xfrm rot="16200000" flipV="1">
-            <a:off x="4939147" y="1640471"/>
-            <a:ext cx="2362879" cy="1367276"/>
+            <a:off x="4985131" y="1686455"/>
+            <a:ext cx="2270911" cy="1367276"/>
           </a:xfrm>
           <a:prstGeom prst="curvedConnector2">
             <a:avLst/>
@@ -3455,8 +3410,8 @@
         </p:nvCxnSpPr>
         <p:spPr>
           <a:xfrm rot="16200000" flipH="1">
-            <a:off x="4487532" y="2166623"/>
-            <a:ext cx="2123108" cy="893830"/>
+            <a:off x="4552564" y="2258591"/>
+            <a:ext cx="1993045" cy="893830"/>
           </a:xfrm>
           <a:prstGeom prst="curvedConnector3">
             <a:avLst>
@@ -3493,8 +3448,8 @@
         </p:nvCxnSpPr>
         <p:spPr>
           <a:xfrm>
-            <a:off x="2286000" y="3032024"/>
-            <a:ext cx="3375224" cy="1052384"/>
+            <a:off x="2462650" y="3156452"/>
+            <a:ext cx="3198574" cy="1019924"/>
           </a:xfrm>
           <a:prstGeom prst="curvedConnector3">
             <a:avLst>
@@ -3531,12 +3486,12 @@
         </p:nvCxnSpPr>
         <p:spPr>
           <a:xfrm rot="5400000" flipH="1">
-            <a:off x="3504800" y="2002523"/>
-            <a:ext cx="937623" cy="4044778"/>
+            <a:off x="3607896" y="2262619"/>
+            <a:ext cx="882211" cy="3893998"/>
           </a:xfrm>
           <a:prstGeom prst="curvedConnector3">
             <a:avLst>
-              <a:gd name="adj1" fmla="val -42463"/>
+              <a:gd name="adj1" fmla="val -48184"/>
             </a:avLst>
           </a:prstGeom>
           <a:ln w="38100">
@@ -3566,8 +3521,8 @@
         </p:nvSpPr>
         <p:spPr>
           <a:xfrm>
-            <a:off x="3989204" y="2314520"/>
-            <a:ext cx="1977915" cy="842538"/>
+            <a:off x="3600704" y="2631740"/>
+            <a:ext cx="3062314" cy="707886"/>
           </a:xfrm>
           <a:prstGeom prst="rect">
             <a:avLst/>
@@ -3581,59 +3536,23 @@
           <a:lstStyle/>
           <a:p>
             <a:r>
-              <a:rPr lang="en-US" sz="1625" dirty="0">
+              <a:rPr lang="en-US" sz="2000" dirty="0">
                 <a:solidFill>
                   <a:schemeClr val="accent6"/>
                 </a:solidFill>
               </a:rPr>
-              <a:t>Merge with </a:t>
-            </a:r>
-            <a:endParaRPr lang="en-US" sz="1625" dirty="0" smtClean="0">
-              <a:solidFill>
-                <a:schemeClr val="accent6"/>
-              </a:solidFill>
-            </a:endParaRPr>
-          </a:p>
-          <a:p>
-            <a:r>
-              <a:rPr lang="en-US" sz="1625" dirty="0" smtClean="0">
-                <a:solidFill>
-                  <a:schemeClr val="accent6"/>
-                </a:solidFill>
-              </a:rPr>
-              <a:t>platoon </a:t>
-            </a:r>
-            <a:r>
-              <a:rPr lang="en-US" sz="1625" dirty="0">
-                <a:solidFill>
-                  <a:schemeClr val="accent6"/>
-                </a:solidFill>
-              </a:rPr>
-              <a:t>in </a:t>
-            </a:r>
-            <a:r>
-              <a:rPr lang="en-US" sz="1625" dirty="0" smtClean="0">
-                <a:solidFill>
-                  <a:schemeClr val="accent6"/>
-                </a:solidFill>
-              </a:rPr>
-              <a:t>front</a:t>
-            </a:r>
-          </a:p>
-          <a:p>
-            <a:r>
-              <a:rPr lang="en-US" sz="1625" dirty="0" smtClean="0">
+              <a:t>Merge with platoon in front</a:t>
+            </a:r>
+          </a:p>
+          <a:p>
+            <a:r>
+              <a:rPr lang="en-US" sz="2000" dirty="0">
                 <a:solidFill>
                   <a:schemeClr val="accent6"/>
                 </a:solidFill>
               </a:rPr>
               <a:t>(get to relative state)</a:t>
             </a:r>
-            <a:endParaRPr lang="en-US" sz="1625" dirty="0">
-              <a:solidFill>
-                <a:schemeClr val="accent6"/>
-              </a:solidFill>
-            </a:endParaRPr>
           </a:p>
         </p:txBody>
       </p:sp>
@@ -3645,8 +3564,8 @@
         </p:nvSpPr>
         <p:spPr>
           <a:xfrm>
-            <a:off x="2936096" y="3657859"/>
-            <a:ext cx="1950790" cy="592470"/>
+            <a:off x="2813077" y="3768512"/>
+            <a:ext cx="2363083" cy="707886"/>
           </a:xfrm>
           <a:prstGeom prst="rect">
             <a:avLst/>
@@ -3660,7 +3579,7 @@
           <a:lstStyle/>
           <a:p>
             <a:r>
-              <a:rPr lang="en-US" sz="1625" dirty="0" smtClean="0">
+              <a:rPr lang="en-US" sz="2000" dirty="0">
                 <a:solidFill>
                   <a:schemeClr val="accent6"/>
                 </a:solidFill>
@@ -3670,18 +3589,13 @@
           </a:p>
           <a:p>
             <a:r>
-              <a:rPr lang="en-US" sz="1625" dirty="0" smtClean="0">
+              <a:rPr lang="en-US" sz="2000" dirty="0">
                 <a:solidFill>
                   <a:schemeClr val="accent6"/>
                 </a:solidFill>
               </a:rPr>
               <a:t>(get to relative state)</a:t>
             </a:r>
-            <a:endParaRPr lang="en-US" sz="1625" dirty="0">
-              <a:solidFill>
-                <a:schemeClr val="accent6"/>
-              </a:solidFill>
-            </a:endParaRPr>
           </a:p>
         </p:txBody>
       </p:sp>
@@ -3696,12 +3610,12 @@
         </p:nvCxnSpPr>
         <p:spPr>
           <a:xfrm rot="16200000" flipH="1">
-            <a:off x="4613287" y="244470"/>
-            <a:ext cx="169544" cy="808223"/>
+            <a:off x="4599818" y="257938"/>
+            <a:ext cx="196481" cy="808223"/>
           </a:xfrm>
           <a:prstGeom prst="curvedConnector3">
             <a:avLst>
-              <a:gd name="adj1" fmla="val -134832"/>
+              <a:gd name="adj1" fmla="val -116347"/>
             </a:avLst>
           </a:prstGeom>
           <a:ln w="38100">
@@ -3731,8 +3645,8 @@
         </p:nvSpPr>
         <p:spPr>
           <a:xfrm>
-            <a:off x="5004054" y="98030"/>
-            <a:ext cx="2826906" cy="592470"/>
+            <a:off x="5043521" y="42715"/>
+            <a:ext cx="3238993" cy="707886"/>
           </a:xfrm>
           <a:prstGeom prst="rect">
             <a:avLst/>
@@ -3746,7 +3660,7 @@
           <a:lstStyle/>
           <a:p>
             <a:r>
-              <a:rPr lang="en-US" sz="1625" dirty="0">
+              <a:rPr lang="en-US" sz="2000" dirty="0">
                 <a:solidFill>
                   <a:schemeClr val="tx1">
                     <a:lumMod val="50000"/>
@@ -3754,23 +3668,12 @@
                   </a:schemeClr>
                 </a:solidFill>
               </a:rPr>
-              <a:t>Follow </a:t>
-            </a:r>
-            <a:r>
-              <a:rPr lang="en-US" sz="1625" dirty="0" smtClean="0">
-                <a:solidFill>
-                  <a:schemeClr val="tx1">
-                    <a:lumMod val="50000"/>
-                    <a:lumOff val="50000"/>
-                  </a:schemeClr>
-                </a:solidFill>
-              </a:rPr>
-              <a:t>highway</a:t>
-            </a:r>
-          </a:p>
-          <a:p>
-            <a:r>
-              <a:rPr lang="en-US" sz="1625" dirty="0" smtClean="0">
+              <a:t>Follow highway</a:t>
+            </a:r>
+          </a:p>
+          <a:p>
+            <a:r>
+              <a:rPr lang="en-US" sz="2000" dirty="0">
                 <a:solidFill>
                   <a:schemeClr val="tx1">
                     <a:lumMod val="50000"/>
@@ -3780,14 +3683,6 @@
               </a:rPr>
               <a:t>(model predictive controller)</a:t>
             </a:r>
-            <a:endParaRPr lang="en-US" sz="1625" dirty="0">
-              <a:solidFill>
-                <a:schemeClr val="tx1">
-                  <a:lumMod val="50000"/>
-                  <a:lumOff val="50000"/>
-                </a:schemeClr>
-              </a:solidFill>
-            </a:endParaRPr>
           </a:p>
         </p:txBody>
       </p:sp>
@@ -3835,8 +3730,8 @@
         </p:nvSpPr>
         <p:spPr>
           <a:xfrm>
-            <a:off x="7277669" y="2700923"/>
-            <a:ext cx="1571624" cy="592470"/>
+            <a:off x="6975835" y="2652436"/>
+            <a:ext cx="1942777" cy="707886"/>
           </a:xfrm>
           <a:prstGeom prst="rect">
             <a:avLst/>
@@ -3850,7 +3745,7 @@
           <a:lstStyle/>
           <a:p>
             <a:r>
-              <a:rPr lang="en-US" sz="1625" dirty="0">
+              <a:rPr lang="en-US" sz="2000" dirty="0">
                 <a:solidFill>
                   <a:schemeClr val="tx1">
                     <a:lumMod val="50000"/>
@@ -3858,23 +3753,12 @@
                   </a:schemeClr>
                 </a:solidFill>
               </a:rPr>
-              <a:t>Follow </a:t>
-            </a:r>
-            <a:r>
-              <a:rPr lang="en-US" sz="1625" dirty="0" smtClean="0">
-                <a:solidFill>
-                  <a:schemeClr val="tx1">
-                    <a:lumMod val="50000"/>
-                    <a:lumOff val="50000"/>
-                  </a:schemeClr>
-                </a:solidFill>
-              </a:rPr>
-              <a:t>platoon</a:t>
-            </a:r>
-          </a:p>
-          <a:p>
-            <a:r>
-              <a:rPr lang="en-US" sz="1625" dirty="0" smtClean="0">
+              <a:t>Follow platoon</a:t>
+            </a:r>
+          </a:p>
+          <a:p>
+            <a:r>
+              <a:rPr lang="en-US" sz="2000" dirty="0">
                 <a:solidFill>
                   <a:schemeClr val="tx1">
                     <a:lumMod val="50000"/>
@@ -3884,14 +3768,6 @@
               </a:rPr>
               <a:t>(PD controller)</a:t>
             </a:r>
-            <a:endParaRPr lang="en-US" sz="1625" dirty="0">
-              <a:solidFill>
-                <a:schemeClr val="tx1">
-                  <a:lumMod val="50000"/>
-                  <a:lumOff val="50000"/>
-                </a:schemeClr>
-              </a:solidFill>
-            </a:endParaRPr>
           </a:p>
         </p:txBody>
       </p:sp>
@@ -3903,8 +3779,8 @@
         </p:nvSpPr>
         <p:spPr>
           <a:xfrm>
-            <a:off x="3385609" y="4825565"/>
-            <a:ext cx="1415516" cy="342401"/>
+            <a:off x="3362496" y="5062847"/>
+            <a:ext cx="1699440" cy="400110"/>
           </a:xfrm>
           <a:prstGeom prst="rect">
             <a:avLst/>
@@ -3918,7 +3794,7 @@
           <a:lstStyle/>
           <a:p>
             <a:r>
-              <a:rPr lang="en-US" sz="1625" dirty="0">
+              <a:rPr lang="en-US" sz="2000" dirty="0">
                 <a:solidFill>
                   <a:schemeClr val="tx1">
                     <a:lumMod val="50000"/>

</xml_diff>